<commit_message>
feat: enhance presentation styles and update content in polyclaw
</commit_message>
<xml_diff>
--- a/presentations/polyclaw.pptx
+++ b/presentations/polyclaw.pptx
@@ -105,6 +105,11 @@
       </a:defRPr>
     </a:lvl9pPr>
   </p:defaultTextStyle>
+  <p:extLst>
+    <p:ext uri="{EFAFB233-063F-42B5-8137-9DF3F51BA10A}">
+      <p15:sldGuideLst xmlns:p15="http://schemas.microsoft.com/office/powerpoint/2012/main"/>
+    </p:ext>
+  </p:extLst>
 </p:presentation>
 </file>
 
@@ -255,7 +260,7 @@
           <a:p>
             <a:fld id="{72C78C57-9C8B-E243-A609-25AB06BC1CB6}" type="datetimeFigureOut">
               <a:rPr lang="en-US" smtClean="0"/>
-              <a:t>2/19/26</a:t>
+              <a:t>2/23/26</a:t>
             </a:fld>
             <a:endParaRPr lang="en-US"/>
           </a:p>
@@ -453,7 +458,7 @@
           <a:p>
             <a:fld id="{72C78C57-9C8B-E243-A609-25AB06BC1CB6}" type="datetimeFigureOut">
               <a:rPr lang="en-US" smtClean="0"/>
-              <a:t>2/19/26</a:t>
+              <a:t>2/23/26</a:t>
             </a:fld>
             <a:endParaRPr lang="en-US"/>
           </a:p>
@@ -661,7 +666,7 @@
           <a:p>
             <a:fld id="{72C78C57-9C8B-E243-A609-25AB06BC1CB6}" type="datetimeFigureOut">
               <a:rPr lang="en-US" smtClean="0"/>
-              <a:t>2/19/26</a:t>
+              <a:t>2/23/26</a:t>
             </a:fld>
             <a:endParaRPr lang="en-US"/>
           </a:p>
@@ -859,7 +864,7 @@
           <a:p>
             <a:fld id="{72C78C57-9C8B-E243-A609-25AB06BC1CB6}" type="datetimeFigureOut">
               <a:rPr lang="en-US" smtClean="0"/>
-              <a:t>2/19/26</a:t>
+              <a:t>2/23/26</a:t>
             </a:fld>
             <a:endParaRPr lang="en-US"/>
           </a:p>
@@ -1134,7 +1139,7 @@
           <a:p>
             <a:fld id="{72C78C57-9C8B-E243-A609-25AB06BC1CB6}" type="datetimeFigureOut">
               <a:rPr lang="en-US" smtClean="0"/>
-              <a:t>2/19/26</a:t>
+              <a:t>2/23/26</a:t>
             </a:fld>
             <a:endParaRPr lang="en-US"/>
           </a:p>
@@ -1399,7 +1404,7 @@
           <a:p>
             <a:fld id="{72C78C57-9C8B-E243-A609-25AB06BC1CB6}" type="datetimeFigureOut">
               <a:rPr lang="en-US" smtClean="0"/>
-              <a:t>2/19/26</a:t>
+              <a:t>2/23/26</a:t>
             </a:fld>
             <a:endParaRPr lang="en-US"/>
           </a:p>
@@ -1811,7 +1816,7 @@
           <a:p>
             <a:fld id="{72C78C57-9C8B-E243-A609-25AB06BC1CB6}" type="datetimeFigureOut">
               <a:rPr lang="en-US" smtClean="0"/>
-              <a:t>2/19/26</a:t>
+              <a:t>2/23/26</a:t>
             </a:fld>
             <a:endParaRPr lang="en-US"/>
           </a:p>
@@ -1952,7 +1957,7 @@
           <a:p>
             <a:fld id="{72C78C57-9C8B-E243-A609-25AB06BC1CB6}" type="datetimeFigureOut">
               <a:rPr lang="en-US" smtClean="0"/>
-              <a:t>2/19/26</a:t>
+              <a:t>2/23/26</a:t>
             </a:fld>
             <a:endParaRPr lang="en-US"/>
           </a:p>
@@ -2065,7 +2070,7 @@
           <a:p>
             <a:fld id="{72C78C57-9C8B-E243-A609-25AB06BC1CB6}" type="datetimeFigureOut">
               <a:rPr lang="en-US" smtClean="0"/>
-              <a:t>2/19/26</a:t>
+              <a:t>2/23/26</a:t>
             </a:fld>
             <a:endParaRPr lang="en-US"/>
           </a:p>
@@ -2376,7 +2381,7 @@
           <a:p>
             <a:fld id="{72C78C57-9C8B-E243-A609-25AB06BC1CB6}" type="datetimeFigureOut">
               <a:rPr lang="en-US" smtClean="0"/>
-              <a:t>2/19/26</a:t>
+              <a:t>2/23/26</a:t>
             </a:fld>
             <a:endParaRPr lang="en-US"/>
           </a:p>
@@ -2664,7 +2669,7 @@
           <a:p>
             <a:fld id="{72C78C57-9C8B-E243-A609-25AB06BC1CB6}" type="datetimeFigureOut">
               <a:rPr lang="en-US" smtClean="0"/>
-              <a:t>2/19/26</a:t>
+              <a:t>2/23/26</a:t>
             </a:fld>
             <a:endParaRPr lang="en-US"/>
           </a:p>
@@ -2905,7 +2910,7 @@
           <a:p>
             <a:fld id="{72C78C57-9C8B-E243-A609-25AB06BC1CB6}" type="datetimeFigureOut">
               <a:rPr lang="en-US" smtClean="0"/>
-              <a:t>2/19/26</a:t>
+              <a:t>2/23/26</a:t>
             </a:fld>
             <a:endParaRPr lang="en-US"/>
           </a:p>
@@ -3324,10 +3329,10 @@
       </p:grpSpPr>
       <p:pic>
         <p:nvPicPr>
-          <p:cNvPr id="12" name="Picture 11" descr="A screenshot of a chat&#10;&#10;AI-generated content may be incorrect.">
-            <a:extLst>
-              <a:ext uri="{FF2B5EF4-FFF2-40B4-BE49-F238E27FC236}">
-                <a16:creationId xmlns:a16="http://schemas.microsoft.com/office/drawing/2014/main" id="{46D4B52A-00B7-BF39-5FE7-A42BEBCCD683}"/>
+          <p:cNvPr id="7" name="Picture 6" descr="A screenshot of a chat&#10;&#10;AI-generated content may be incorrect.">
+            <a:extLst>
+              <a:ext uri="{FF2B5EF4-FFF2-40B4-BE49-F238E27FC236}">
+                <a16:creationId xmlns:a16="http://schemas.microsoft.com/office/drawing/2014/main" id="{EFCFBCBD-91A7-0053-1EDD-CC686133ACAE}"/>
               </a:ext>
             </a:extLst>
           </p:cNvPr>
@@ -3344,8 +3349,8 @@
         </p:blipFill>
         <p:spPr>
           <a:xfrm>
-            <a:off x="0" y="17113"/>
-            <a:ext cx="12222578" cy="6840887"/>
+            <a:off x="-16805" y="-44726"/>
+            <a:ext cx="12225609" cy="6947452"/>
           </a:xfrm>
           <a:prstGeom prst="rect">
             <a:avLst/>
@@ -3407,33 +3412,60 @@
           </a:p>
         </p:txBody>
       </p:sp>
+      <p:sp>
+        <p:nvSpPr>
+          <p:cNvPr id="7" name="Content Placeholder 6">
+            <a:extLst>
+              <a:ext uri="{FF2B5EF4-FFF2-40B4-BE49-F238E27FC236}">
+                <a16:creationId xmlns:a16="http://schemas.microsoft.com/office/drawing/2014/main" id="{C3E3CA33-30F9-6B19-AAA5-7FBEF8D01468}"/>
+              </a:ext>
+            </a:extLst>
+          </p:cNvPr>
+          <p:cNvSpPr>
+            <a:spLocks noGrp="1"/>
+          </p:cNvSpPr>
+          <p:nvPr>
+            <p:ph idx="1"/>
+          </p:nvPr>
+        </p:nvSpPr>
+        <p:spPr/>
+        <p:txBody>
+          <a:bodyPr/>
+          <a:lstStyle/>
+          <a:p>
+            <a:endParaRPr lang="en-US"/>
+          </a:p>
+        </p:txBody>
+      </p:sp>
       <p:pic>
         <p:nvPicPr>
-          <p:cNvPr id="6" name="Content Placeholder 5" descr="A screenshot of a computer&#10;&#10;AI-generated content may be incorrect.">
-            <a:extLst>
-              <a:ext uri="{FF2B5EF4-FFF2-40B4-BE49-F238E27FC236}">
-                <a16:creationId xmlns:a16="http://schemas.microsoft.com/office/drawing/2014/main" id="{D56B2D95-7C1B-2B73-773D-94E951C4622E}"/>
+          <p:cNvPr id="8" name="Picture 7" descr="A screenshot of a computer&#10;&#10;AI-generated content may be incorrect.">
+            <a:extLst>
+              <a:ext uri="{FF2B5EF4-FFF2-40B4-BE49-F238E27FC236}">
+                <a16:creationId xmlns:a16="http://schemas.microsoft.com/office/drawing/2014/main" id="{3DE1504B-D6AA-7B0E-0014-38A3CC074038}"/>
               </a:ext>
             </a:extLst>
           </p:cNvPr>
           <p:cNvPicPr>
-            <a:picLocks noGrp="1" noChangeAspect="1"/>
+            <a:picLocks noChangeAspect="1"/>
           </p:cNvPicPr>
-          <p:nvPr>
-            <p:ph idx="1"/>
-          </p:nvPr>
+          <p:nvPr/>
         </p:nvPicPr>
         <p:blipFill>
           <a:blip r:embed="rId2"/>
+          <a:srcRect l="985" t="5062" r="3589" b="5064"/>
           <a:stretch>
             <a:fillRect/>
           </a:stretch>
         </p:blipFill>
         <p:spPr>
           <a:xfrm>
-            <a:off x="-584273" y="-45720"/>
-            <a:ext cx="13412799" cy="6949440"/>
+            <a:off x="0" y="0"/>
+            <a:ext cx="12192000" cy="6858000"/>
           </a:xfrm>
+          <a:prstGeom prst="rect">
+            <a:avLst/>
+          </a:prstGeom>
         </p:spPr>
       </p:pic>
     </p:spTree>

</xml_diff>

<commit_message>
feat: enhance presentation styles and update content in polyclaw (#11)
</commit_message>
<xml_diff>
--- a/presentations/polyclaw.pptx
+++ b/presentations/polyclaw.pptx
@@ -105,6 +105,11 @@
       </a:defRPr>
     </a:lvl9pPr>
   </p:defaultTextStyle>
+  <p:extLst>
+    <p:ext uri="{EFAFB233-063F-42B5-8137-9DF3F51BA10A}">
+      <p15:sldGuideLst xmlns:p15="http://schemas.microsoft.com/office/powerpoint/2012/main"/>
+    </p:ext>
+  </p:extLst>
 </p:presentation>
 </file>
 
@@ -255,7 +260,7 @@
           <a:p>
             <a:fld id="{72C78C57-9C8B-E243-A609-25AB06BC1CB6}" type="datetimeFigureOut">
               <a:rPr lang="en-US" smtClean="0"/>
-              <a:t>2/19/26</a:t>
+              <a:t>2/23/26</a:t>
             </a:fld>
             <a:endParaRPr lang="en-US"/>
           </a:p>
@@ -453,7 +458,7 @@
           <a:p>
             <a:fld id="{72C78C57-9C8B-E243-A609-25AB06BC1CB6}" type="datetimeFigureOut">
               <a:rPr lang="en-US" smtClean="0"/>
-              <a:t>2/19/26</a:t>
+              <a:t>2/23/26</a:t>
             </a:fld>
             <a:endParaRPr lang="en-US"/>
           </a:p>
@@ -661,7 +666,7 @@
           <a:p>
             <a:fld id="{72C78C57-9C8B-E243-A609-25AB06BC1CB6}" type="datetimeFigureOut">
               <a:rPr lang="en-US" smtClean="0"/>
-              <a:t>2/19/26</a:t>
+              <a:t>2/23/26</a:t>
             </a:fld>
             <a:endParaRPr lang="en-US"/>
           </a:p>
@@ -859,7 +864,7 @@
           <a:p>
             <a:fld id="{72C78C57-9C8B-E243-A609-25AB06BC1CB6}" type="datetimeFigureOut">
               <a:rPr lang="en-US" smtClean="0"/>
-              <a:t>2/19/26</a:t>
+              <a:t>2/23/26</a:t>
             </a:fld>
             <a:endParaRPr lang="en-US"/>
           </a:p>
@@ -1134,7 +1139,7 @@
           <a:p>
             <a:fld id="{72C78C57-9C8B-E243-A609-25AB06BC1CB6}" type="datetimeFigureOut">
               <a:rPr lang="en-US" smtClean="0"/>
-              <a:t>2/19/26</a:t>
+              <a:t>2/23/26</a:t>
             </a:fld>
             <a:endParaRPr lang="en-US"/>
           </a:p>
@@ -1399,7 +1404,7 @@
           <a:p>
             <a:fld id="{72C78C57-9C8B-E243-A609-25AB06BC1CB6}" type="datetimeFigureOut">
               <a:rPr lang="en-US" smtClean="0"/>
-              <a:t>2/19/26</a:t>
+              <a:t>2/23/26</a:t>
             </a:fld>
             <a:endParaRPr lang="en-US"/>
           </a:p>
@@ -1811,7 +1816,7 @@
           <a:p>
             <a:fld id="{72C78C57-9C8B-E243-A609-25AB06BC1CB6}" type="datetimeFigureOut">
               <a:rPr lang="en-US" smtClean="0"/>
-              <a:t>2/19/26</a:t>
+              <a:t>2/23/26</a:t>
             </a:fld>
             <a:endParaRPr lang="en-US"/>
           </a:p>
@@ -1952,7 +1957,7 @@
           <a:p>
             <a:fld id="{72C78C57-9C8B-E243-A609-25AB06BC1CB6}" type="datetimeFigureOut">
               <a:rPr lang="en-US" smtClean="0"/>
-              <a:t>2/19/26</a:t>
+              <a:t>2/23/26</a:t>
             </a:fld>
             <a:endParaRPr lang="en-US"/>
           </a:p>
@@ -2065,7 +2070,7 @@
           <a:p>
             <a:fld id="{72C78C57-9C8B-E243-A609-25AB06BC1CB6}" type="datetimeFigureOut">
               <a:rPr lang="en-US" smtClean="0"/>
-              <a:t>2/19/26</a:t>
+              <a:t>2/23/26</a:t>
             </a:fld>
             <a:endParaRPr lang="en-US"/>
           </a:p>
@@ -2376,7 +2381,7 @@
           <a:p>
             <a:fld id="{72C78C57-9C8B-E243-A609-25AB06BC1CB6}" type="datetimeFigureOut">
               <a:rPr lang="en-US" smtClean="0"/>
-              <a:t>2/19/26</a:t>
+              <a:t>2/23/26</a:t>
             </a:fld>
             <a:endParaRPr lang="en-US"/>
           </a:p>
@@ -2664,7 +2669,7 @@
           <a:p>
             <a:fld id="{72C78C57-9C8B-E243-A609-25AB06BC1CB6}" type="datetimeFigureOut">
               <a:rPr lang="en-US" smtClean="0"/>
-              <a:t>2/19/26</a:t>
+              <a:t>2/23/26</a:t>
             </a:fld>
             <a:endParaRPr lang="en-US"/>
           </a:p>
@@ -2905,7 +2910,7 @@
           <a:p>
             <a:fld id="{72C78C57-9C8B-E243-A609-25AB06BC1CB6}" type="datetimeFigureOut">
               <a:rPr lang="en-US" smtClean="0"/>
-              <a:t>2/19/26</a:t>
+              <a:t>2/23/26</a:t>
             </a:fld>
             <a:endParaRPr lang="en-US"/>
           </a:p>
@@ -3324,10 +3329,10 @@
       </p:grpSpPr>
       <p:pic>
         <p:nvPicPr>
-          <p:cNvPr id="12" name="Picture 11" descr="A screenshot of a chat&#10;&#10;AI-generated content may be incorrect.">
-            <a:extLst>
-              <a:ext uri="{FF2B5EF4-FFF2-40B4-BE49-F238E27FC236}">
-                <a16:creationId xmlns:a16="http://schemas.microsoft.com/office/drawing/2014/main" id="{46D4B52A-00B7-BF39-5FE7-A42BEBCCD683}"/>
+          <p:cNvPr id="7" name="Picture 6" descr="A screenshot of a chat&#10;&#10;AI-generated content may be incorrect.">
+            <a:extLst>
+              <a:ext uri="{FF2B5EF4-FFF2-40B4-BE49-F238E27FC236}">
+                <a16:creationId xmlns:a16="http://schemas.microsoft.com/office/drawing/2014/main" id="{EFCFBCBD-91A7-0053-1EDD-CC686133ACAE}"/>
               </a:ext>
             </a:extLst>
           </p:cNvPr>
@@ -3344,8 +3349,8 @@
         </p:blipFill>
         <p:spPr>
           <a:xfrm>
-            <a:off x="0" y="17113"/>
-            <a:ext cx="12222578" cy="6840887"/>
+            <a:off x="-16805" y="-44726"/>
+            <a:ext cx="12225609" cy="6947452"/>
           </a:xfrm>
           <a:prstGeom prst="rect">
             <a:avLst/>
@@ -3407,33 +3412,60 @@
           </a:p>
         </p:txBody>
       </p:sp>
+      <p:sp>
+        <p:nvSpPr>
+          <p:cNvPr id="7" name="Content Placeholder 6">
+            <a:extLst>
+              <a:ext uri="{FF2B5EF4-FFF2-40B4-BE49-F238E27FC236}">
+                <a16:creationId xmlns:a16="http://schemas.microsoft.com/office/drawing/2014/main" id="{C3E3CA33-30F9-6B19-AAA5-7FBEF8D01468}"/>
+              </a:ext>
+            </a:extLst>
+          </p:cNvPr>
+          <p:cNvSpPr>
+            <a:spLocks noGrp="1"/>
+          </p:cNvSpPr>
+          <p:nvPr>
+            <p:ph idx="1"/>
+          </p:nvPr>
+        </p:nvSpPr>
+        <p:spPr/>
+        <p:txBody>
+          <a:bodyPr/>
+          <a:lstStyle/>
+          <a:p>
+            <a:endParaRPr lang="en-US"/>
+          </a:p>
+        </p:txBody>
+      </p:sp>
       <p:pic>
         <p:nvPicPr>
-          <p:cNvPr id="6" name="Content Placeholder 5" descr="A screenshot of a computer&#10;&#10;AI-generated content may be incorrect.">
-            <a:extLst>
-              <a:ext uri="{FF2B5EF4-FFF2-40B4-BE49-F238E27FC236}">
-                <a16:creationId xmlns:a16="http://schemas.microsoft.com/office/drawing/2014/main" id="{D56B2D95-7C1B-2B73-773D-94E951C4622E}"/>
+          <p:cNvPr id="8" name="Picture 7" descr="A screenshot of a computer&#10;&#10;AI-generated content may be incorrect.">
+            <a:extLst>
+              <a:ext uri="{FF2B5EF4-FFF2-40B4-BE49-F238E27FC236}">
+                <a16:creationId xmlns:a16="http://schemas.microsoft.com/office/drawing/2014/main" id="{3DE1504B-D6AA-7B0E-0014-38A3CC074038}"/>
               </a:ext>
             </a:extLst>
           </p:cNvPr>
           <p:cNvPicPr>
-            <a:picLocks noGrp="1" noChangeAspect="1"/>
+            <a:picLocks noChangeAspect="1"/>
           </p:cNvPicPr>
-          <p:nvPr>
-            <p:ph idx="1"/>
-          </p:nvPr>
+          <p:nvPr/>
         </p:nvPicPr>
         <p:blipFill>
           <a:blip r:embed="rId2"/>
+          <a:srcRect l="985" t="5062" r="3589" b="5064"/>
           <a:stretch>
             <a:fillRect/>
           </a:stretch>
         </p:blipFill>
         <p:spPr>
           <a:xfrm>
-            <a:off x="-584273" y="-45720"/>
-            <a:ext cx="13412799" cy="6949440"/>
+            <a:off x="0" y="0"/>
+            <a:ext cx="12192000" cy="6858000"/>
           </a:xfrm>
+          <a:prstGeom prst="rect">
+            <a:avLst/>
+          </a:prstGeom>
         </p:spPr>
       </p:pic>
     </p:spTree>

</xml_diff>